<commit_message>
node & grunt project configured
</commit_message>
<xml_diff>
--- a/presentacion/presentacion.pptx
+++ b/presentacion/presentacion.pptx
@@ -11,6 +11,7 @@
     <p:sldId id="275" r:id="rId5"/>
     <p:sldId id="277" r:id="rId6"/>
     <p:sldId id="278" r:id="rId7"/>
+    <p:sldId id="279" r:id="rId8"/>
   </p:sldIdLst>
   <p:sldSz cx="12192000" cy="6858000"/>
   <p:notesSz cx="6858000" cy="9144000"/>
@@ -112,12 +113,12 @@
   <p:extLst>
     <p:ext uri="{EFAFB233-063F-42B5-8137-9DF3F51BA10A}">
       <p15:sldGuideLst xmlns:p15="http://schemas.microsoft.com/office/powerpoint/2012/main">
-        <p15:guide id="1" orient="horz" pos="2160">
+        <p15:guide id="1" orient="horz" pos="2160" userDrawn="1">
           <p15:clr>
             <a:srgbClr val="A4A3A4"/>
           </p15:clr>
         </p15:guide>
-        <p15:guide id="2" pos="3840">
+        <p15:guide id="2" pos="3840" userDrawn="1">
           <p15:clr>
             <a:srgbClr val="A4A3A4"/>
           </p15:clr>
@@ -153,8 +154,8 @@
         </p:nvSpPr>
         <p:spPr>
           <a:xfrm>
-            <a:off x="446534" y="3085765"/>
-            <a:ext cx="11262866" cy="3304800"/>
+            <a:off x="446533" y="3085765"/>
+            <a:ext cx="11262867" cy="3304800"/>
           </a:xfrm>
           <a:prstGeom prst="rect">
             <a:avLst/>
@@ -194,7 +195,7 @@
         </p:nvSpPr>
         <p:spPr>
           <a:xfrm>
-            <a:off x="581191" y="1020431"/>
+            <a:off x="581192" y="1020431"/>
             <a:ext cx="10993549" cy="1475013"/>
           </a:xfrm>
           <a:effectLst/>
@@ -233,8 +234,8 @@
         </p:nvSpPr>
         <p:spPr>
           <a:xfrm>
-            <a:off x="581194" y="2495445"/>
-            <a:ext cx="10993546" cy="590321"/>
+            <a:off x="581193" y="2495449"/>
+            <a:ext cx="10993547" cy="590321"/>
           </a:xfrm>
         </p:spPr>
         <p:txBody>
@@ -250,7 +251,7 @@
                 </a:solidFill>
               </a:defRPr>
             </a:lvl1pPr>
-            <a:lvl2pPr marL="457200" indent="0" algn="ctr">
+            <a:lvl2pPr marL="457189" indent="0" algn="ctr">
               <a:buNone/>
               <a:defRPr>
                 <a:solidFill>
@@ -260,7 +261,7 @@
                 </a:solidFill>
               </a:defRPr>
             </a:lvl2pPr>
-            <a:lvl3pPr marL="914400" indent="0" algn="ctr">
+            <a:lvl3pPr marL="914377" indent="0" algn="ctr">
               <a:buNone/>
               <a:defRPr>
                 <a:solidFill>
@@ -270,7 +271,7 @@
                 </a:solidFill>
               </a:defRPr>
             </a:lvl3pPr>
-            <a:lvl4pPr marL="1371600" indent="0" algn="ctr">
+            <a:lvl4pPr marL="1371566" indent="0" algn="ctr">
               <a:buNone/>
               <a:defRPr>
                 <a:solidFill>
@@ -280,7 +281,7 @@
                 </a:solidFill>
               </a:defRPr>
             </a:lvl4pPr>
-            <a:lvl5pPr marL="1828800" indent="0" algn="ctr">
+            <a:lvl5pPr marL="1828754" indent="0" algn="ctr">
               <a:buNone/>
               <a:defRPr>
                 <a:solidFill>
@@ -290,7 +291,7 @@
                 </a:solidFill>
               </a:defRPr>
             </a:lvl5pPr>
-            <a:lvl6pPr marL="2286000" indent="0" algn="ctr">
+            <a:lvl6pPr marL="2285943" indent="0" algn="ctr">
               <a:buNone/>
               <a:defRPr>
                 <a:solidFill>
@@ -300,7 +301,7 @@
                 </a:solidFill>
               </a:defRPr>
             </a:lvl6pPr>
-            <a:lvl7pPr marL="2743200" indent="0" algn="ctr">
+            <a:lvl7pPr marL="2743131" indent="0" algn="ctr">
               <a:buNone/>
               <a:defRPr>
                 <a:solidFill>
@@ -310,7 +311,7 @@
                 </a:solidFill>
               </a:defRPr>
             </a:lvl7pPr>
-            <a:lvl8pPr marL="3200400" indent="0" algn="ctr">
+            <a:lvl8pPr marL="3200320" indent="0" algn="ctr">
               <a:buNone/>
               <a:defRPr>
                 <a:solidFill>
@@ -320,7 +321,7 @@
                 </a:solidFill>
               </a:defRPr>
             </a:lvl8pPr>
-            <a:lvl9pPr marL="3657600" indent="0" algn="ctr">
+            <a:lvl9pPr marL="3657509" indent="0" algn="ctr">
               <a:buNone/>
               <a:defRPr>
                 <a:solidFill>
@@ -352,7 +353,7 @@
         </p:nvSpPr>
         <p:spPr>
           <a:xfrm>
-            <a:off x="7605951" y="5956137"/>
+            <a:off x="7605951" y="5956141"/>
             <a:ext cx="2844800" cy="365125"/>
           </a:xfrm>
         </p:spPr>
@@ -374,7 +375,7 @@
             <a:fld id="{B61BEF0D-F0BB-DE4B-95CE-6DB70DBA9567}" type="datetimeFigureOut">
               <a:rPr lang="en-US" smtClean="0"/>
               <a:pPr/>
-              <a:t>2/6/2014</a:t>
+              <a:t>2/10/2014</a:t>
             </a:fld>
             <a:endParaRPr lang="en-US" dirty="0"/>
           </a:p>
@@ -392,8 +393,8 @@
         </p:nvSpPr>
         <p:spPr>
           <a:xfrm>
-            <a:off x="581192" y="5951811"/>
-            <a:ext cx="6917210" cy="365125"/>
+            <a:off x="581193" y="5951815"/>
+            <a:ext cx="6917211" cy="365125"/>
           </a:xfrm>
         </p:spPr>
         <p:txBody>
@@ -427,7 +428,7 @@
         </p:nvSpPr>
         <p:spPr>
           <a:xfrm>
-            <a:off x="10558300" y="5956137"/>
+            <a:off x="10558300" y="5956141"/>
             <a:ext cx="1016440" cy="365125"/>
           </a:xfrm>
         </p:spPr>
@@ -495,8 +496,8 @@
         </p:nvSpPr>
         <p:spPr>
           <a:xfrm>
-            <a:off x="440286" y="614407"/>
-            <a:ext cx="11309338" cy="1189298"/>
+            <a:off x="440285" y="614407"/>
+            <a:ext cx="11309339" cy="1189298"/>
           </a:xfrm>
           <a:prstGeom prst="rect">
             <a:avLst/>
@@ -638,7 +639,7 @@
             <a:fld id="{B61BEF0D-F0BB-DE4B-95CE-6DB70DBA9567}" type="datetimeFigureOut">
               <a:rPr lang="en-US" smtClean="0"/>
               <a:pPr/>
-              <a:t>2/6/2014</a:t>
+              <a:t>2/10/2014</a:t>
             </a:fld>
             <a:endParaRPr lang="en-US" dirty="0"/>
           </a:p>
@@ -727,7 +728,7 @@
         </p:nvSpPr>
         <p:spPr>
           <a:xfrm>
-            <a:off x="8839201" y="599725"/>
+            <a:off x="8839204" y="599725"/>
             <a:ext cx="2906817" cy="5816950"/>
           </a:xfrm>
           <a:prstGeom prst="rect">
@@ -768,7 +769,7 @@
         </p:nvSpPr>
         <p:spPr>
           <a:xfrm>
-            <a:off x="8839201" y="675726"/>
+            <a:off x="8839203" y="675730"/>
             <a:ext cx="2004164" cy="5183073"/>
           </a:xfrm>
         </p:spPr>
@@ -796,7 +797,7 @@
         </p:nvSpPr>
         <p:spPr>
           <a:xfrm>
-            <a:off x="774923" y="675726"/>
+            <a:off x="774926" y="675730"/>
             <a:ext cx="7896279" cy="5183073"/>
           </a:xfrm>
         </p:spPr>
@@ -853,7 +854,7 @@
         </p:nvSpPr>
         <p:spPr>
           <a:xfrm>
-            <a:off x="8993673" y="5956137"/>
+            <a:off x="8993675" y="5956141"/>
             <a:ext cx="1328141" cy="365125"/>
           </a:xfrm>
         </p:spPr>
@@ -875,7 +876,7 @@
             <a:fld id="{B61BEF0D-F0BB-DE4B-95CE-6DB70DBA9567}" type="datetimeFigureOut">
               <a:rPr lang="en-US" smtClean="0"/>
               <a:pPr/>
-              <a:t>2/6/2014</a:t>
+              <a:t>2/10/2014</a:t>
             </a:fld>
             <a:endParaRPr lang="en-US" dirty="0"/>
           </a:p>
@@ -893,7 +894,7 @@
         </p:nvSpPr>
         <p:spPr>
           <a:xfrm>
-            <a:off x="774923" y="5951811"/>
+            <a:off x="774926" y="5951815"/>
             <a:ext cx="7896279" cy="365125"/>
           </a:xfrm>
         </p:spPr>
@@ -917,7 +918,7 @@
         </p:nvSpPr>
         <p:spPr>
           <a:xfrm>
-            <a:off x="10446615" y="5956137"/>
+            <a:off x="10446617" y="5956141"/>
             <a:ext cx="1164195" cy="365125"/>
           </a:xfrm>
         </p:spPr>
@@ -985,8 +986,8 @@
         </p:nvSpPr>
         <p:spPr>
           <a:xfrm>
-            <a:off x="440286" y="614407"/>
-            <a:ext cx="11309338" cy="1189298"/>
+            <a:off x="440285" y="614407"/>
+            <a:ext cx="11309339" cy="1189298"/>
           </a:xfrm>
           <a:prstGeom prst="rect">
             <a:avLst/>
@@ -1054,7 +1055,7 @@
         </p:nvSpPr>
         <p:spPr>
           <a:xfrm>
-            <a:off x="581192" y="2180496"/>
+            <a:off x="581195" y="2180500"/>
             <a:ext cx="11029615" cy="3678303"/>
           </a:xfrm>
         </p:spPr>
@@ -1117,7 +1118,7 @@
             <a:fld id="{B61BEF0D-F0BB-DE4B-95CE-6DB70DBA9567}" type="datetimeFigureOut">
               <a:rPr lang="en-US" smtClean="0"/>
               <a:pPr/>
-              <a:t>2/6/2014</a:t>
+              <a:t>2/10/2014</a:t>
             </a:fld>
             <a:endParaRPr lang="en-US" dirty="0"/>
           </a:p>
@@ -1154,7 +1155,7 @@
         </p:nvSpPr>
         <p:spPr>
           <a:xfrm>
-            <a:off x="10558300" y="5956137"/>
+            <a:off x="10558302" y="5956141"/>
             <a:ext cx="1052508" cy="365125"/>
           </a:xfrm>
         </p:spPr>
@@ -1218,7 +1219,7 @@
         </p:nvSpPr>
         <p:spPr>
           <a:xfrm>
-            <a:off x="447817" y="5141974"/>
+            <a:off x="447819" y="5141978"/>
             <a:ext cx="11290860" cy="1258827"/>
           </a:xfrm>
           <a:prstGeom prst="rect">
@@ -1259,7 +1260,7 @@
         </p:nvSpPr>
         <p:spPr>
           <a:xfrm>
-            <a:off x="581193" y="3043910"/>
+            <a:off x="581195" y="3043914"/>
             <a:ext cx="11029615" cy="1497507"/>
           </a:xfrm>
         </p:spPr>
@@ -1297,7 +1298,7 @@
         </p:nvSpPr>
         <p:spPr>
           <a:xfrm>
-            <a:off x="581192" y="4541417"/>
+            <a:off x="581195" y="4541417"/>
             <a:ext cx="11029615" cy="600556"/>
           </a:xfrm>
         </p:spPr>
@@ -1314,7 +1315,7 @@
                 </a:solidFill>
               </a:defRPr>
             </a:lvl1pPr>
-            <a:lvl2pPr marL="457200" indent="0">
+            <a:lvl2pPr marL="457189" indent="0">
               <a:buNone/>
               <a:defRPr sz="1800">
                 <a:solidFill>
@@ -1324,7 +1325,7 @@
                 </a:solidFill>
               </a:defRPr>
             </a:lvl2pPr>
-            <a:lvl3pPr marL="914400" indent="0">
+            <a:lvl3pPr marL="914377" indent="0">
               <a:buNone/>
               <a:defRPr sz="1600">
                 <a:solidFill>
@@ -1334,7 +1335,7 @@
                 </a:solidFill>
               </a:defRPr>
             </a:lvl3pPr>
-            <a:lvl4pPr marL="1371600" indent="0">
+            <a:lvl4pPr marL="1371566" indent="0">
               <a:buNone/>
               <a:defRPr sz="1400">
                 <a:solidFill>
@@ -1344,7 +1345,7 @@
                 </a:solidFill>
               </a:defRPr>
             </a:lvl4pPr>
-            <a:lvl5pPr marL="1828800" indent="0">
+            <a:lvl5pPr marL="1828754" indent="0">
               <a:buNone/>
               <a:defRPr sz="1400">
                 <a:solidFill>
@@ -1354,7 +1355,7 @@
                 </a:solidFill>
               </a:defRPr>
             </a:lvl5pPr>
-            <a:lvl6pPr marL="2286000" indent="0">
+            <a:lvl6pPr marL="2285943" indent="0">
               <a:buNone/>
               <a:defRPr sz="1400">
                 <a:solidFill>
@@ -1364,7 +1365,7 @@
                 </a:solidFill>
               </a:defRPr>
             </a:lvl6pPr>
-            <a:lvl7pPr marL="2743200" indent="0">
+            <a:lvl7pPr marL="2743131" indent="0">
               <a:buNone/>
               <a:defRPr sz="1400">
                 <a:solidFill>
@@ -1374,7 +1375,7 @@
                 </a:solidFill>
               </a:defRPr>
             </a:lvl7pPr>
-            <a:lvl8pPr marL="3200400" indent="0">
+            <a:lvl8pPr marL="3200320" indent="0">
               <a:buNone/>
               <a:defRPr sz="1400">
                 <a:solidFill>
@@ -1384,7 +1385,7 @@
                 </a:solidFill>
               </a:defRPr>
             </a:lvl8pPr>
-            <a:lvl9pPr marL="3657600" indent="0">
+            <a:lvl9pPr marL="3657509" indent="0">
               <a:buNone/>
               <a:defRPr sz="1400">
                 <a:solidFill>
@@ -1433,7 +1434,7 @@
             <a:fld id="{B61BEF0D-F0BB-DE4B-95CE-6DB70DBA9567}" type="datetimeFigureOut">
               <a:rPr lang="en-US" smtClean="0"/>
               <a:pPr/>
-              <a:t>2/6/2014</a:t>
+              <a:t>2/10/2014</a:t>
             </a:fld>
             <a:endParaRPr lang="en-US" dirty="0"/>
           </a:p>
@@ -1551,7 +1552,7 @@
         </p:nvSpPr>
         <p:spPr>
           <a:xfrm>
-            <a:off x="445982" y="606554"/>
+            <a:off x="445983" y="606558"/>
             <a:ext cx="11300036" cy="1258827"/>
           </a:xfrm>
           <a:prstGeom prst="rect">
@@ -1620,8 +1621,8 @@
         </p:nvSpPr>
         <p:spPr>
           <a:xfrm>
-            <a:off x="581193" y="2228003"/>
-            <a:ext cx="5422390" cy="3633047"/>
+            <a:off x="581195" y="2228004"/>
+            <a:ext cx="5422391" cy="3633047"/>
           </a:xfrm>
         </p:spPr>
         <p:txBody>
@@ -1679,7 +1680,7 @@
         </p:nvSpPr>
         <p:spPr>
           <a:xfrm>
-            <a:off x="6188417" y="2228003"/>
+            <a:off x="6188417" y="2228004"/>
             <a:ext cx="5422392" cy="3633047"/>
           </a:xfrm>
         </p:spPr>
@@ -1744,7 +1745,7 @@
             <a:fld id="{B61BEF0D-F0BB-DE4B-95CE-6DB70DBA9567}" type="datetimeFigureOut">
               <a:rPr lang="en-US" smtClean="0"/>
               <a:pPr/>
-              <a:t>2/6/2014</a:t>
+              <a:t>2/10/2014</a:t>
             </a:fld>
             <a:endParaRPr lang="en-US" dirty="0"/>
           </a:p>
@@ -1840,7 +1841,7 @@
         </p:nvSpPr>
         <p:spPr>
           <a:xfrm>
-            <a:off x="445982" y="606554"/>
+            <a:off x="445983" y="606558"/>
             <a:ext cx="11300036" cy="1258827"/>
           </a:xfrm>
           <a:prstGeom prst="rect">
@@ -1909,7 +1910,7 @@
         </p:nvSpPr>
         <p:spPr>
           <a:xfrm>
-            <a:off x="887219" y="2250892"/>
+            <a:off x="887221" y="2250896"/>
             <a:ext cx="5087075" cy="536005"/>
           </a:xfrm>
         </p:spPr>
@@ -1926,35 +1927,35 @@
                 </a:solidFill>
               </a:defRPr>
             </a:lvl1pPr>
-            <a:lvl2pPr marL="457200" indent="0">
+            <a:lvl2pPr marL="457189" indent="0">
               <a:buNone/>
               <a:defRPr sz="2000" b="1"/>
             </a:lvl2pPr>
-            <a:lvl3pPr marL="914400" indent="0">
+            <a:lvl3pPr marL="914377" indent="0">
               <a:buNone/>
               <a:defRPr sz="1800" b="1"/>
             </a:lvl3pPr>
-            <a:lvl4pPr marL="1371600" indent="0">
+            <a:lvl4pPr marL="1371566" indent="0">
               <a:buNone/>
               <a:defRPr sz="1600" b="1"/>
             </a:lvl4pPr>
-            <a:lvl5pPr marL="1828800" indent="0">
+            <a:lvl5pPr marL="1828754" indent="0">
               <a:buNone/>
               <a:defRPr sz="1600" b="1"/>
             </a:lvl5pPr>
-            <a:lvl6pPr marL="2286000" indent="0">
+            <a:lvl6pPr marL="2285943" indent="0">
               <a:buNone/>
               <a:defRPr sz="1600" b="1"/>
             </a:lvl6pPr>
-            <a:lvl7pPr marL="2743200" indent="0">
+            <a:lvl7pPr marL="2743131" indent="0">
               <a:buNone/>
               <a:defRPr sz="1600" b="1"/>
             </a:lvl7pPr>
-            <a:lvl8pPr marL="3200400" indent="0">
+            <a:lvl8pPr marL="3200320" indent="0">
               <a:buNone/>
               <a:defRPr sz="1600" b="1"/>
             </a:lvl8pPr>
-            <a:lvl9pPr marL="3657600" indent="0">
+            <a:lvl9pPr marL="3657509" indent="0">
               <a:buNone/>
               <a:defRPr sz="1600" b="1"/>
             </a:lvl9pPr>
@@ -1980,7 +1981,7 @@
         </p:nvSpPr>
         <p:spPr>
           <a:xfrm>
-            <a:off x="581194" y="2926052"/>
+            <a:off x="581195" y="2926056"/>
             <a:ext cx="5393100" cy="2934999"/>
           </a:xfrm>
         </p:spPr>
@@ -2039,7 +2040,7 @@
         </p:nvSpPr>
         <p:spPr>
           <a:xfrm>
-            <a:off x="6523735" y="2250892"/>
+            <a:off x="6523738" y="2250896"/>
             <a:ext cx="5087073" cy="553373"/>
           </a:xfrm>
         </p:spPr>
@@ -2056,35 +2057,35 @@
                 </a:solidFill>
               </a:defRPr>
             </a:lvl1pPr>
-            <a:lvl2pPr marL="457200" indent="0">
+            <a:lvl2pPr marL="457189" indent="0">
               <a:buNone/>
               <a:defRPr sz="2000" b="1"/>
             </a:lvl2pPr>
-            <a:lvl3pPr marL="914400" indent="0">
+            <a:lvl3pPr marL="914377" indent="0">
               <a:buNone/>
               <a:defRPr sz="1800" b="1"/>
             </a:lvl3pPr>
-            <a:lvl4pPr marL="1371600" indent="0">
+            <a:lvl4pPr marL="1371566" indent="0">
               <a:buNone/>
               <a:defRPr sz="1600" b="1"/>
             </a:lvl4pPr>
-            <a:lvl5pPr marL="1828800" indent="0">
+            <a:lvl5pPr marL="1828754" indent="0">
               <a:buNone/>
               <a:defRPr sz="1600" b="1"/>
             </a:lvl5pPr>
-            <a:lvl6pPr marL="2286000" indent="0">
+            <a:lvl6pPr marL="2285943" indent="0">
               <a:buNone/>
               <a:defRPr sz="1600" b="1"/>
             </a:lvl6pPr>
-            <a:lvl7pPr marL="2743200" indent="0">
+            <a:lvl7pPr marL="2743131" indent="0">
               <a:buNone/>
               <a:defRPr sz="1600" b="1"/>
             </a:lvl7pPr>
-            <a:lvl8pPr marL="3200400" indent="0">
+            <a:lvl8pPr marL="3200320" indent="0">
               <a:buNone/>
               <a:defRPr sz="1600" b="1"/>
             </a:lvl8pPr>
-            <a:lvl9pPr marL="3657600" indent="0">
+            <a:lvl9pPr marL="3657509" indent="0">
               <a:buNone/>
               <a:defRPr sz="1600" b="1"/>
             </a:lvl9pPr>
@@ -2110,7 +2111,7 @@
         </p:nvSpPr>
         <p:spPr>
           <a:xfrm>
-            <a:off x="6217709" y="2926052"/>
+            <a:off x="6217711" y="2926056"/>
             <a:ext cx="5393100" cy="2934999"/>
           </a:xfrm>
         </p:spPr>
@@ -2175,7 +2176,7 @@
             <a:fld id="{B61BEF0D-F0BB-DE4B-95CE-6DB70DBA9567}" type="datetimeFigureOut">
               <a:rPr lang="en-US" smtClean="0"/>
               <a:pPr/>
-              <a:t>2/6/2014</a:t>
+              <a:t>2/10/2014</a:t>
             </a:fld>
             <a:endParaRPr lang="en-US" dirty="0"/>
           </a:p>
@@ -2272,7 +2273,7 @@
             <a:fld id="{B61BEF0D-F0BB-DE4B-95CE-6DB70DBA9567}" type="datetimeFigureOut">
               <a:rPr lang="en-US" smtClean="0"/>
               <a:pPr/>
-              <a:t>2/6/2014</a:t>
+              <a:t>2/10/2014</a:t>
             </a:fld>
             <a:endParaRPr lang="en-US" dirty="0"/>
           </a:p>
@@ -2331,7 +2332,7 @@
         </p:nvSpPr>
         <p:spPr>
           <a:xfrm>
-            <a:off x="440683" y="606554"/>
+            <a:off x="440683" y="606558"/>
             <a:ext cx="11300036" cy="1258827"/>
           </a:xfrm>
           <a:prstGeom prst="rect">
@@ -2372,7 +2373,7 @@
         </p:nvSpPr>
         <p:spPr>
           <a:xfrm>
-            <a:off x="575894" y="729658"/>
+            <a:off x="575895" y="729658"/>
             <a:ext cx="11029616" cy="988332"/>
           </a:xfrm>
         </p:spPr>
@@ -2436,7 +2437,7 @@
             <a:fld id="{B61BEF0D-F0BB-DE4B-95CE-6DB70DBA9567}" type="datetimeFigureOut">
               <a:rPr lang="en-US" smtClean="0"/>
               <a:pPr/>
-              <a:t>2/6/2014</a:t>
+              <a:t>2/10/2014</a:t>
             </a:fld>
             <a:endParaRPr lang="en-US" dirty="0"/>
           </a:p>
@@ -2728,7 +2729,7 @@
         </p:nvSpPr>
         <p:spPr>
           <a:xfrm>
-            <a:off x="5740823" y="5262296"/>
+            <a:off x="5740825" y="5262300"/>
             <a:ext cx="5869987" cy="689515"/>
           </a:xfrm>
         </p:spPr>
@@ -2745,35 +2746,35 @@
                 </a:solidFill>
               </a:defRPr>
             </a:lvl1pPr>
-            <a:lvl2pPr marL="457200" indent="0">
+            <a:lvl2pPr marL="457189" indent="0">
               <a:buNone/>
               <a:defRPr sz="1100"/>
             </a:lvl2pPr>
-            <a:lvl3pPr marL="914400" indent="0">
+            <a:lvl3pPr marL="914377" indent="0">
               <a:buNone/>
               <a:defRPr sz="1000"/>
             </a:lvl3pPr>
-            <a:lvl4pPr marL="1371600" indent="0">
+            <a:lvl4pPr marL="1371566" indent="0">
               <a:buNone/>
               <a:defRPr sz="900"/>
             </a:lvl4pPr>
-            <a:lvl5pPr marL="1828800" indent="0">
+            <a:lvl5pPr marL="1828754" indent="0">
               <a:buNone/>
               <a:defRPr sz="900"/>
             </a:lvl5pPr>
-            <a:lvl6pPr marL="2286000" indent="0">
+            <a:lvl6pPr marL="2285943" indent="0">
               <a:buNone/>
               <a:defRPr sz="900"/>
             </a:lvl6pPr>
-            <a:lvl7pPr marL="2743200" indent="0">
+            <a:lvl7pPr marL="2743131" indent="0">
               <a:buNone/>
               <a:defRPr sz="900"/>
             </a:lvl7pPr>
-            <a:lvl8pPr marL="3200400" indent="0">
+            <a:lvl8pPr marL="3200320" indent="0">
               <a:buNone/>
               <a:defRPr sz="900"/>
             </a:lvl8pPr>
-            <a:lvl9pPr marL="3657600" indent="0">
+            <a:lvl9pPr marL="3657509" indent="0">
               <a:buNone/>
               <a:defRPr sz="900"/>
             </a:lvl9pPr>
@@ -2816,7 +2817,7 @@
             <a:fld id="{B61BEF0D-F0BB-DE4B-95CE-6DB70DBA9567}" type="datetimeFigureOut">
               <a:rPr lang="en-US" smtClean="0"/>
               <a:pPr/>
-              <a:t>2/6/2014</a:t>
+              <a:t>2/10/2014</a:t>
             </a:fld>
             <a:endParaRPr lang="en-US" dirty="0"/>
           </a:p>
@@ -2980,35 +2981,35 @@
               <a:buNone/>
               <a:defRPr sz="1600"/>
             </a:lvl1pPr>
-            <a:lvl2pPr marL="457200" indent="0">
+            <a:lvl2pPr marL="457189" indent="0">
               <a:buNone/>
               <a:defRPr sz="1600"/>
             </a:lvl2pPr>
-            <a:lvl3pPr marL="914400" indent="0">
+            <a:lvl3pPr marL="914377" indent="0">
               <a:buNone/>
               <a:defRPr sz="1600"/>
             </a:lvl3pPr>
-            <a:lvl4pPr marL="1371600" indent="0">
+            <a:lvl4pPr marL="1371566" indent="0">
               <a:buNone/>
               <a:defRPr sz="1600"/>
             </a:lvl4pPr>
-            <a:lvl5pPr marL="1828800" indent="0">
+            <a:lvl5pPr marL="1828754" indent="0">
               <a:buNone/>
               <a:defRPr sz="1600"/>
             </a:lvl5pPr>
-            <a:lvl6pPr marL="2286000" indent="0">
+            <a:lvl6pPr marL="2285943" indent="0">
               <a:buNone/>
               <a:defRPr sz="1600"/>
             </a:lvl6pPr>
-            <a:lvl7pPr marL="2743200" indent="0">
+            <a:lvl7pPr marL="2743131" indent="0">
               <a:buNone/>
               <a:defRPr sz="1600"/>
             </a:lvl7pPr>
-            <a:lvl8pPr marL="3200400" indent="0">
+            <a:lvl8pPr marL="3200320" indent="0">
               <a:buNone/>
               <a:defRPr sz="1600"/>
             </a:lvl8pPr>
-            <a:lvl9pPr marL="3657600" indent="0">
+            <a:lvl9pPr marL="3657509" indent="0">
               <a:buNone/>
               <a:defRPr sz="1600"/>
             </a:lvl9pPr>
@@ -3034,7 +3035,7 @@
         </p:nvSpPr>
         <p:spPr>
           <a:xfrm>
-            <a:off x="581192" y="5260127"/>
+            <a:off x="581194" y="5260131"/>
             <a:ext cx="11029617" cy="598671"/>
           </a:xfrm>
         </p:spPr>
@@ -3047,35 +3048,35 @@
               <a:buNone/>
               <a:defRPr sz="1200"/>
             </a:lvl1pPr>
-            <a:lvl2pPr marL="457200" indent="0">
+            <a:lvl2pPr marL="457189" indent="0">
               <a:buNone/>
               <a:defRPr sz="1200"/>
             </a:lvl2pPr>
-            <a:lvl3pPr marL="914400" indent="0">
+            <a:lvl3pPr marL="914377" indent="0">
               <a:buNone/>
               <a:defRPr sz="1000"/>
             </a:lvl3pPr>
-            <a:lvl4pPr marL="1371600" indent="0">
+            <a:lvl4pPr marL="1371566" indent="0">
               <a:buNone/>
               <a:defRPr sz="900"/>
             </a:lvl4pPr>
-            <a:lvl5pPr marL="1828800" indent="0">
+            <a:lvl5pPr marL="1828754" indent="0">
               <a:buNone/>
               <a:defRPr sz="900"/>
             </a:lvl5pPr>
-            <a:lvl6pPr marL="2286000" indent="0">
+            <a:lvl6pPr marL="2285943" indent="0">
               <a:buNone/>
               <a:defRPr sz="900"/>
             </a:lvl6pPr>
-            <a:lvl7pPr marL="2743200" indent="0">
+            <a:lvl7pPr marL="2743131" indent="0">
               <a:buNone/>
               <a:defRPr sz="900"/>
             </a:lvl7pPr>
-            <a:lvl8pPr marL="3200400" indent="0">
+            <a:lvl8pPr marL="3200320" indent="0">
               <a:buNone/>
               <a:defRPr sz="900"/>
             </a:lvl8pPr>
-            <a:lvl9pPr marL="3657600" indent="0">
+            <a:lvl9pPr marL="3657509" indent="0">
               <a:buNone/>
               <a:defRPr sz="900"/>
             </a:lvl9pPr>
@@ -3107,7 +3108,7 @@
             <a:fld id="{B61BEF0D-F0BB-DE4B-95CE-6DB70DBA9567}" type="datetimeFigureOut">
               <a:rPr lang="en-US" smtClean="0"/>
               <a:pPr/>
-              <a:t>2/6/2014</a:t>
+              <a:t>2/10/2014</a:t>
             </a:fld>
             <a:endParaRPr lang="en-US" dirty="0"/>
           </a:p>
@@ -3298,7 +3299,7 @@
         </p:nvSpPr>
         <p:spPr>
           <a:xfrm>
-            <a:off x="7605951" y="5956137"/>
+            <a:off x="7605954" y="5956141"/>
             <a:ext cx="2844799" cy="365125"/>
           </a:xfrm>
           <a:prstGeom prst="rect">
@@ -3320,7 +3321,7 @@
             <a:fld id="{B61BEF0D-F0BB-DE4B-95CE-6DB70DBA9567}" type="datetimeFigureOut">
               <a:rPr lang="en-US" smtClean="0"/>
               <a:pPr/>
-              <a:t>2/6/2014</a:t>
+              <a:t>2/10/2014</a:t>
             </a:fld>
             <a:endParaRPr lang="en-US" dirty="0"/>
           </a:p>
@@ -3338,8 +3339,8 @@
         </p:nvSpPr>
         <p:spPr>
           <a:xfrm>
-            <a:off x="581192" y="5951811"/>
-            <a:ext cx="6917210" cy="365125"/>
+            <a:off x="581193" y="5951815"/>
+            <a:ext cx="6917211" cy="365125"/>
           </a:xfrm>
           <a:prstGeom prst="rect">
             <a:avLst/>
@@ -3373,8 +3374,8 @@
         </p:nvSpPr>
         <p:spPr>
           <a:xfrm>
-            <a:off x="10558300" y="5956137"/>
-            <a:ext cx="1052510" cy="365125"/>
+            <a:off x="10558302" y="5956141"/>
+            <a:ext cx="1052511" cy="365125"/>
           </a:xfrm>
           <a:prstGeom prst="rect">
             <a:avLst/>
@@ -3409,7 +3410,7 @@
         </p:nvSpPr>
         <p:spPr>
           <a:xfrm>
-            <a:off x="446534" y="457200"/>
+            <a:off x="446535" y="457200"/>
             <a:ext cx="3703320" cy="94997"/>
           </a:xfrm>
           <a:prstGeom prst="rect">
@@ -3483,7 +3484,7 @@
         </p:nvSpPr>
         <p:spPr>
           <a:xfrm>
-            <a:off x="4241830" y="457200"/>
+            <a:off x="4241831" y="457200"/>
             <a:ext cx="3703320" cy="91440"/>
           </a:xfrm>
           <a:prstGeom prst="rect">
@@ -3535,7 +3536,7 @@
   </p:sldLayoutIdLst>
   <p:txStyles>
     <p:titleStyle>
-      <a:lvl1pPr algn="l" defTabSz="457200" rtl="0" eaLnBrk="1" latinLnBrk="0" hangingPunct="1">
+      <a:lvl1pPr algn="l" defTabSz="457189" rtl="0" eaLnBrk="1" latinLnBrk="0" hangingPunct="1">
         <a:spcBef>
           <a:spcPct val="0"/>
         </a:spcBef>
@@ -3607,7 +3608,7 @@
       </a:lvl9pPr>
     </p:titleStyle>
     <p:bodyStyle>
-      <a:lvl1pPr marL="306000" indent="-306000" algn="l" defTabSz="457200" rtl="0" eaLnBrk="1" latinLnBrk="0" hangingPunct="1">
+      <a:lvl1pPr marL="305992" indent="-305992" algn="l" defTabSz="457189" rtl="0" eaLnBrk="1" latinLnBrk="0" hangingPunct="1">
         <a:spcBef>
           <a:spcPct val="20000"/>
         </a:spcBef>
@@ -3629,7 +3630,7 @@
           <a:cs typeface="+mn-cs"/>
         </a:defRPr>
       </a:lvl1pPr>
-      <a:lvl2pPr marL="630000" indent="-306000" algn="l" defTabSz="457200" rtl="0" eaLnBrk="1" latinLnBrk="0" hangingPunct="1">
+      <a:lvl2pPr marL="629984" indent="-305992" algn="l" defTabSz="457189" rtl="0" eaLnBrk="1" latinLnBrk="0" hangingPunct="1">
         <a:spcBef>
           <a:spcPct val="20000"/>
         </a:spcBef>
@@ -3651,7 +3652,7 @@
           <a:cs typeface="+mn-cs"/>
         </a:defRPr>
       </a:lvl2pPr>
-      <a:lvl3pPr marL="900000" indent="-270000" algn="l" defTabSz="457200" rtl="0" eaLnBrk="1" latinLnBrk="0" hangingPunct="1">
+      <a:lvl3pPr marL="899978" indent="-269993" algn="l" defTabSz="457189" rtl="0" eaLnBrk="1" latinLnBrk="0" hangingPunct="1">
         <a:spcBef>
           <a:spcPct val="20000"/>
         </a:spcBef>
@@ -3673,7 +3674,7 @@
           <a:cs typeface="+mn-cs"/>
         </a:defRPr>
       </a:lvl3pPr>
-      <a:lvl4pPr marL="1242000" indent="-234000" algn="l" defTabSz="457200" rtl="0" eaLnBrk="1" latinLnBrk="0" hangingPunct="1">
+      <a:lvl4pPr marL="1241969" indent="-233994" algn="l" defTabSz="457189" rtl="0" eaLnBrk="1" latinLnBrk="0" hangingPunct="1">
         <a:spcBef>
           <a:spcPct val="20000"/>
         </a:spcBef>
@@ -3695,7 +3696,7 @@
           <a:cs typeface="+mn-cs"/>
         </a:defRPr>
       </a:lvl4pPr>
-      <a:lvl5pPr marL="1602000" indent="-234000" algn="l" defTabSz="457200" rtl="0" eaLnBrk="1" latinLnBrk="0" hangingPunct="1">
+      <a:lvl5pPr marL="1601960" indent="-233994" algn="l" defTabSz="457189" rtl="0" eaLnBrk="1" latinLnBrk="0" hangingPunct="1">
         <a:spcBef>
           <a:spcPct val="20000"/>
         </a:spcBef>
@@ -3717,7 +3718,7 @@
           <a:cs typeface="+mn-cs"/>
         </a:defRPr>
       </a:lvl5pPr>
-      <a:lvl6pPr marL="1900000" indent="-228600" algn="l" defTabSz="457200" rtl="0" eaLnBrk="1" latinLnBrk="0" hangingPunct="1">
+      <a:lvl6pPr marL="1899953" indent="-228594" algn="l" defTabSz="457189" rtl="0" eaLnBrk="1" latinLnBrk="0" hangingPunct="1">
         <a:spcBef>
           <a:spcPct val="20000"/>
         </a:spcBef>
@@ -3739,7 +3740,7 @@
           <a:cs typeface="+mn-cs"/>
         </a:defRPr>
       </a:lvl6pPr>
-      <a:lvl7pPr marL="2200000" indent="-228600" algn="l" defTabSz="457200" rtl="0" eaLnBrk="1" latinLnBrk="0" hangingPunct="1">
+      <a:lvl7pPr marL="2199945" indent="-228594" algn="l" defTabSz="457189" rtl="0" eaLnBrk="1" latinLnBrk="0" hangingPunct="1">
         <a:spcBef>
           <a:spcPct val="20000"/>
         </a:spcBef>
@@ -3761,7 +3762,7 @@
           <a:cs typeface="+mn-cs"/>
         </a:defRPr>
       </a:lvl7pPr>
-      <a:lvl8pPr marL="2500000" indent="-228600" algn="l" defTabSz="457200" rtl="0" eaLnBrk="1" latinLnBrk="0" hangingPunct="1">
+      <a:lvl8pPr marL="2499938" indent="-228594" algn="l" defTabSz="457189" rtl="0" eaLnBrk="1" latinLnBrk="0" hangingPunct="1">
         <a:spcBef>
           <a:spcPct val="20000"/>
         </a:spcBef>
@@ -3783,7 +3784,7 @@
           <a:cs typeface="+mn-cs"/>
         </a:defRPr>
       </a:lvl8pPr>
-      <a:lvl9pPr marL="2800000" indent="-228600" algn="l" defTabSz="457200" rtl="0" eaLnBrk="1" latinLnBrk="0" hangingPunct="1">
+      <a:lvl9pPr marL="2799930" indent="-228594" algn="l" defTabSz="457189" rtl="0" eaLnBrk="1" latinLnBrk="0" hangingPunct="1">
         <a:spcBef>
           <a:spcPct val="20000"/>
         </a:spcBef>
@@ -3810,7 +3811,7 @@
       <a:defPPr>
         <a:defRPr lang="en-US"/>
       </a:defPPr>
-      <a:lvl1pPr marL="0" algn="l" defTabSz="457200" rtl="0" eaLnBrk="1" latinLnBrk="0" hangingPunct="1">
+      <a:lvl1pPr marL="0" algn="l" defTabSz="457189" rtl="0" eaLnBrk="1" latinLnBrk="0" hangingPunct="1">
         <a:defRPr sz="1800" kern="1200">
           <a:solidFill>
             <a:schemeClr val="tx1"/>
@@ -3820,7 +3821,7 @@
           <a:cs typeface="+mn-cs"/>
         </a:defRPr>
       </a:lvl1pPr>
-      <a:lvl2pPr marL="457200" algn="l" defTabSz="457200" rtl="0" eaLnBrk="1" latinLnBrk="0" hangingPunct="1">
+      <a:lvl2pPr marL="457189" algn="l" defTabSz="457189" rtl="0" eaLnBrk="1" latinLnBrk="0" hangingPunct="1">
         <a:defRPr sz="1800" kern="1200">
           <a:solidFill>
             <a:schemeClr val="tx1"/>
@@ -3830,7 +3831,7 @@
           <a:cs typeface="+mn-cs"/>
         </a:defRPr>
       </a:lvl2pPr>
-      <a:lvl3pPr marL="914400" algn="l" defTabSz="457200" rtl="0" eaLnBrk="1" latinLnBrk="0" hangingPunct="1">
+      <a:lvl3pPr marL="914377" algn="l" defTabSz="457189" rtl="0" eaLnBrk="1" latinLnBrk="0" hangingPunct="1">
         <a:defRPr sz="1800" kern="1200">
           <a:solidFill>
             <a:schemeClr val="tx1"/>
@@ -3840,7 +3841,7 @@
           <a:cs typeface="+mn-cs"/>
         </a:defRPr>
       </a:lvl3pPr>
-      <a:lvl4pPr marL="1371600" algn="l" defTabSz="457200" rtl="0" eaLnBrk="1" latinLnBrk="0" hangingPunct="1">
+      <a:lvl4pPr marL="1371566" algn="l" defTabSz="457189" rtl="0" eaLnBrk="1" latinLnBrk="0" hangingPunct="1">
         <a:defRPr sz="1800" kern="1200">
           <a:solidFill>
             <a:schemeClr val="tx1"/>
@@ -3850,7 +3851,7 @@
           <a:cs typeface="+mn-cs"/>
         </a:defRPr>
       </a:lvl4pPr>
-      <a:lvl5pPr marL="1828800" algn="l" defTabSz="457200" rtl="0" eaLnBrk="1" latinLnBrk="0" hangingPunct="1">
+      <a:lvl5pPr marL="1828754" algn="l" defTabSz="457189" rtl="0" eaLnBrk="1" latinLnBrk="0" hangingPunct="1">
         <a:defRPr sz="1800" kern="1200">
           <a:solidFill>
             <a:schemeClr val="tx1"/>
@@ -3860,7 +3861,7 @@
           <a:cs typeface="+mn-cs"/>
         </a:defRPr>
       </a:lvl5pPr>
-      <a:lvl6pPr marL="2286000" algn="l" defTabSz="457200" rtl="0" eaLnBrk="1" latinLnBrk="0" hangingPunct="1">
+      <a:lvl6pPr marL="2285943" algn="l" defTabSz="457189" rtl="0" eaLnBrk="1" latinLnBrk="0" hangingPunct="1">
         <a:defRPr sz="1800" kern="1200">
           <a:solidFill>
             <a:schemeClr val="tx1"/>
@@ -3870,7 +3871,7 @@
           <a:cs typeface="+mn-cs"/>
         </a:defRPr>
       </a:lvl6pPr>
-      <a:lvl7pPr marL="2743200" algn="l" defTabSz="457200" rtl="0" eaLnBrk="1" latinLnBrk="0" hangingPunct="1">
+      <a:lvl7pPr marL="2743131" algn="l" defTabSz="457189" rtl="0" eaLnBrk="1" latinLnBrk="0" hangingPunct="1">
         <a:defRPr sz="1800" kern="1200">
           <a:solidFill>
             <a:schemeClr val="tx1"/>
@@ -3880,7 +3881,7 @@
           <a:cs typeface="+mn-cs"/>
         </a:defRPr>
       </a:lvl7pPr>
-      <a:lvl8pPr marL="3200400" algn="l" defTabSz="457200" rtl="0" eaLnBrk="1" latinLnBrk="0" hangingPunct="1">
+      <a:lvl8pPr marL="3200320" algn="l" defTabSz="457189" rtl="0" eaLnBrk="1" latinLnBrk="0" hangingPunct="1">
         <a:defRPr sz="1800" kern="1200">
           <a:solidFill>
             <a:schemeClr val="tx1"/>
@@ -3890,7 +3891,7 @@
           <a:cs typeface="+mn-cs"/>
         </a:defRPr>
       </a:lvl8pPr>
-      <a:lvl9pPr marL="3657600" algn="l" defTabSz="457200" rtl="0" eaLnBrk="1" latinLnBrk="0" hangingPunct="1">
+      <a:lvl9pPr marL="3657509" algn="l" defTabSz="457189" rtl="0" eaLnBrk="1" latinLnBrk="0" hangingPunct="1">
         <a:defRPr sz="1800" kern="1200">
           <a:solidFill>
             <a:schemeClr val="tx1"/>
@@ -3932,8 +3933,8 @@
         </p:nvSpPr>
         <p:spPr bwMode="auto">
           <a:xfrm>
-            <a:off x="3787417" y="5027052"/>
-            <a:ext cx="3142446" cy="3142456"/>
+            <a:off x="3787420" y="5027052"/>
+            <a:ext cx="3142447" cy="3142456"/>
           </a:xfrm>
           <a:prstGeom prst="rect">
             <a:avLst/>
@@ -3984,7 +3985,7 @@
         </p:blipFill>
         <p:spPr bwMode="auto">
           <a:xfrm>
-            <a:off x="1296445" y="111102"/>
+            <a:off x="1296445" y="111103"/>
             <a:ext cx="9445896" cy="7084423"/>
           </a:xfrm>
           <a:prstGeom prst="rect">
@@ -4051,7 +4052,7 @@
         </p:nvSpPr>
         <p:spPr>
           <a:xfrm>
-            <a:off x="581191" y="659823"/>
+            <a:off x="581192" y="659824"/>
             <a:ext cx="10993549" cy="1475013"/>
           </a:xfrm>
         </p:spPr>
@@ -4062,11 +4063,11 @@
           <a:lstStyle/>
           <a:p>
             <a:r>
-              <a:rPr lang="es-ES" sz="7200" b="1" dirty="0" smtClean="0"/>
+              <a:rPr lang="es-ES" sz="7200" b="1" dirty="0"/>
               <a:t>Borja </a:t>
             </a:r>
             <a:r>
-              <a:rPr lang="es-ES" sz="7200" b="1" dirty="0" err="1" smtClean="0"/>
+              <a:rPr lang="es-ES" sz="7200" b="1" dirty="0" err="1"/>
               <a:t>andrés</a:t>
             </a:r>
             <a:endParaRPr lang="es-ES" sz="7200" b="1" dirty="0"/>
@@ -4085,8 +4086,8 @@
         </p:nvSpPr>
         <p:spPr>
           <a:xfrm>
-            <a:off x="581191" y="2129448"/>
-            <a:ext cx="7239686" cy="737929"/>
+            <a:off x="581191" y="2129449"/>
+            <a:ext cx="7239687" cy="737929"/>
           </a:xfrm>
         </p:spPr>
         <p:txBody>
@@ -4096,19 +4097,19 @@
           <a:lstStyle/>
           <a:p>
             <a:r>
-              <a:rPr lang="es-ES" sz="4000" dirty="0" smtClean="0"/>
+              <a:rPr lang="es-ES" sz="4000" dirty="0"/>
               <a:t>Front-</a:t>
             </a:r>
             <a:r>
-              <a:rPr lang="es-ES" sz="4000" dirty="0" err="1" smtClean="0"/>
+              <a:rPr lang="es-ES" sz="4000" dirty="0" err="1"/>
               <a:t>end</a:t>
             </a:r>
             <a:r>
-              <a:rPr lang="es-ES" sz="4000" dirty="0" smtClean="0"/>
+              <a:rPr lang="es-ES" sz="4000" dirty="0"/>
               <a:t> </a:t>
             </a:r>
             <a:r>
-              <a:rPr lang="es-ES" sz="4000" dirty="0" err="1" smtClean="0"/>
+              <a:rPr lang="es-ES" sz="4000" dirty="0" err="1"/>
               <a:t>Developer</a:t>
             </a:r>
             <a:endParaRPr lang="es-ES" sz="4000" dirty="0"/>
@@ -4125,8 +4126,8 @@
         </p:nvSpPr>
         <p:spPr bwMode="auto">
           <a:xfrm>
-            <a:off x="3787417" y="5027052"/>
-            <a:ext cx="3142446" cy="3142456"/>
+            <a:off x="3787420" y="5027052"/>
+            <a:ext cx="3142447" cy="3142456"/>
           </a:xfrm>
           <a:prstGeom prst="rect">
             <a:avLst/>
@@ -4177,7 +4178,7 @@
         </p:blipFill>
         <p:spPr bwMode="auto">
           <a:xfrm>
-            <a:off x="9009968" y="3297766"/>
+            <a:off x="9009972" y="3297770"/>
             <a:ext cx="2459543" cy="2885233"/>
           </a:xfrm>
           <a:prstGeom prst="rect">
@@ -4205,7 +4206,7 @@
         </p:nvSpPr>
         <p:spPr>
           <a:xfrm>
-            <a:off x="773105" y="3397955"/>
+            <a:off x="773105" y="3397957"/>
             <a:ext cx="7761296" cy="2867377"/>
           </a:xfrm>
           <a:prstGeom prst="rect">
@@ -4421,7 +4422,7 @@
               <a:buNone/>
             </a:pPr>
             <a:r>
-              <a:rPr lang="en-US" sz="2800" dirty="0" smtClean="0"/>
+              <a:rPr lang="en-US" sz="2800" dirty="0"/>
               <a:t>@borya09</a:t>
             </a:r>
           </a:p>
@@ -4434,29 +4435,29 @@
               <a:t>http</a:t>
             </a:r>
             <a:r>
-              <a:rPr lang="en-US" sz="2800" dirty="0" smtClean="0"/>
+              <a:rPr lang="en-US" sz="2800" dirty="0"/>
               <a:t>://</a:t>
             </a:r>
             <a:r>
-              <a:rPr lang="es-ES" sz="2800" dirty="0" smtClean="0"/>
+              <a:rPr lang="es-ES" sz="2800" dirty="0"/>
               <a:t>es.linkedin.com/in/</a:t>
             </a:r>
             <a:r>
-              <a:rPr lang="es-ES" sz="2800" dirty="0" err="1" smtClean="0"/>
+              <a:rPr lang="es-ES" sz="2800" dirty="0" err="1"/>
               <a:t>borjaandres</a:t>
             </a:r>
             <a:r>
-              <a:rPr lang="es-ES" sz="2800" dirty="0" smtClean="0"/>
+              <a:rPr lang="es-ES" sz="2800" dirty="0"/>
               <a:t>/</a:t>
             </a:r>
-            <a:endParaRPr lang="en-US" sz="2800" dirty="0" smtClean="0"/>
+            <a:endParaRPr lang="en-US" sz="2800" dirty="0"/>
           </a:p>
           <a:p>
             <a:pPr marL="0" indent="0" algn="ctr">
               <a:buNone/>
             </a:pPr>
             <a:r>
-              <a:rPr lang="en-US" sz="2800" dirty="0" smtClean="0"/>
+              <a:rPr lang="en-US" sz="2800" dirty="0"/>
               <a:t>http://www.borjaandres.com</a:t>
             </a:r>
             <a:endParaRPr lang="en-US" sz="2800" dirty="0"/>
@@ -4537,7 +4538,7 @@
         </p:blipFill>
         <p:spPr bwMode="auto">
           <a:xfrm>
-            <a:off x="9972094" y="401035"/>
+            <a:off x="9972097" y="401035"/>
             <a:ext cx="2186181" cy="1639636"/>
           </a:xfrm>
           <a:prstGeom prst="rect">
@@ -4578,7 +4579,7 @@
           <a:lstStyle/>
           <a:p>
             <a:r>
-              <a:rPr lang="es-ES" sz="4800" b="1" dirty="0" smtClean="0"/>
+              <a:rPr lang="es-ES" sz="4800" b="1" dirty="0"/>
               <a:t>¿Qué es?</a:t>
             </a:r>
             <a:endParaRPr lang="es-ES" sz="4800" b="1" dirty="0"/>
@@ -4608,7 +4609,7 @@
               </a:lnSpc>
             </a:pPr>
             <a:r>
-              <a:rPr lang="es-ES" sz="2800" dirty="0" smtClean="0"/>
+              <a:rPr lang="es-ES" sz="2800" dirty="0"/>
               <a:t>Framework MVW</a:t>
             </a:r>
           </a:p>
@@ -4619,7 +4620,7 @@
               </a:lnSpc>
             </a:pPr>
             <a:r>
-              <a:rPr lang="es-ES" sz="2800" dirty="0" smtClean="0"/>
+              <a:rPr lang="es-ES" sz="2800" dirty="0"/>
               <a:t>Aplicaciones SPI</a:t>
             </a:r>
           </a:p>
@@ -4630,7 +4631,7 @@
               </a:lnSpc>
             </a:pPr>
             <a:r>
-              <a:rPr lang="es-ES" sz="2800" dirty="0" smtClean="0"/>
+              <a:rPr lang="es-ES" sz="2800" dirty="0"/>
               <a:t>Extiende sintaxis HTML</a:t>
             </a:r>
           </a:p>
@@ -4696,7 +4697,7 @@
         </p:blipFill>
         <p:spPr bwMode="auto">
           <a:xfrm>
-            <a:off x="9972094" y="401035"/>
+            <a:off x="9972097" y="401035"/>
             <a:ext cx="2186181" cy="1639636"/>
           </a:xfrm>
           <a:prstGeom prst="rect">
@@ -4737,7 +4738,7 @@
           <a:lstStyle/>
           <a:p>
             <a:r>
-              <a:rPr lang="es-ES" sz="4800" b="1" dirty="0" smtClean="0"/>
+              <a:rPr lang="es-ES" sz="4800" b="1" dirty="0"/>
               <a:t>¿POR Qué (ME) MOLA?</a:t>
             </a:r>
             <a:endParaRPr lang="es-ES" sz="4800" b="1" dirty="0"/>
@@ -4756,7 +4757,7 @@
         </p:nvSpPr>
         <p:spPr>
           <a:xfrm>
-            <a:off x="581192" y="2180496"/>
+            <a:off x="581194" y="2180497"/>
             <a:ext cx="11160233" cy="4233556"/>
           </a:xfrm>
         </p:spPr>
@@ -4772,7 +4773,7 @@
               </a:lnSpc>
             </a:pPr>
             <a:r>
-              <a:rPr lang="es-ES" sz="2800" dirty="0" smtClean="0"/>
+              <a:rPr lang="es-ES" sz="2800" dirty="0"/>
               <a:t>Arquitectura</a:t>
             </a:r>
           </a:p>
@@ -4783,26 +4784,26 @@
               </a:lnSpc>
             </a:pPr>
             <a:r>
-              <a:rPr lang="es-ES" sz="2800" dirty="0" err="1" smtClean="0"/>
+              <a:rPr lang="es-ES" sz="2800" dirty="0" err="1"/>
               <a:t>Two</a:t>
             </a:r>
             <a:r>
-              <a:rPr lang="es-ES" sz="2800" dirty="0" smtClean="0"/>
+              <a:rPr lang="es-ES" sz="2800" dirty="0"/>
               <a:t> </a:t>
             </a:r>
             <a:r>
-              <a:rPr lang="es-ES" sz="2800" dirty="0" err="1" smtClean="0"/>
+              <a:rPr lang="es-ES" sz="2800" dirty="0" err="1"/>
               <a:t>way</a:t>
             </a:r>
             <a:r>
-              <a:rPr lang="es-ES" sz="2800" dirty="0" smtClean="0"/>
+              <a:rPr lang="es-ES" sz="2800" dirty="0"/>
               <a:t> data </a:t>
             </a:r>
             <a:r>
-              <a:rPr lang="es-ES" sz="2800" dirty="0" err="1" smtClean="0"/>
+              <a:rPr lang="es-ES" sz="2800" dirty="0" err="1"/>
               <a:t>binding</a:t>
             </a:r>
-            <a:endParaRPr lang="es-ES" sz="2800" dirty="0" smtClean="0"/>
+            <a:endParaRPr lang="es-ES" sz="2800" dirty="0"/>
           </a:p>
           <a:p>
             <a:pPr algn="just">
@@ -4811,10 +4812,10 @@
               </a:lnSpc>
             </a:pPr>
             <a:r>
-              <a:rPr lang="es-ES" sz="2800" dirty="0" err="1" smtClean="0"/>
+              <a:rPr lang="es-ES" sz="2800" dirty="0" err="1"/>
               <a:t>Templates</a:t>
             </a:r>
-            <a:endParaRPr lang="es-ES" sz="2800" dirty="0" smtClean="0"/>
+            <a:endParaRPr lang="es-ES" sz="2800" dirty="0"/>
           </a:p>
           <a:p>
             <a:pPr>
@@ -4823,7 +4824,7 @@
               </a:lnSpc>
             </a:pPr>
             <a:r>
-              <a:rPr lang="es-ES" sz="2800" dirty="0" smtClean="0"/>
+              <a:rPr lang="es-ES" sz="2800" dirty="0"/>
               <a:t>Inyección de dependencias</a:t>
             </a:r>
           </a:p>
@@ -4834,10 +4835,10 @@
               </a:lnSpc>
             </a:pPr>
             <a:r>
-              <a:rPr lang="es-ES" sz="2800" dirty="0" err="1" smtClean="0"/>
+              <a:rPr lang="es-ES" sz="2800" dirty="0" err="1"/>
               <a:t>Testing</a:t>
             </a:r>
-            <a:endParaRPr lang="es-ES" sz="2800" dirty="0" smtClean="0"/>
+            <a:endParaRPr lang="es-ES" sz="2800" dirty="0"/>
           </a:p>
           <a:p>
             <a:pPr algn="just">
@@ -4846,7 +4847,7 @@
               </a:lnSpc>
             </a:pPr>
             <a:r>
-              <a:rPr lang="es-ES" sz="2800" dirty="0" smtClean="0"/>
+              <a:rPr lang="es-ES" sz="2800" dirty="0"/>
               <a:t>Directivas</a:t>
             </a:r>
             <a:endParaRPr lang="es-ES" sz="2800" dirty="0"/>
@@ -4913,7 +4914,7 @@
         </p:blipFill>
         <p:spPr bwMode="auto">
           <a:xfrm>
-            <a:off x="9972094" y="401035"/>
+            <a:off x="9972097" y="401035"/>
             <a:ext cx="2186181" cy="1639636"/>
           </a:xfrm>
           <a:prstGeom prst="rect">
@@ -4954,11 +4955,11 @@
           <a:lstStyle/>
           <a:p>
             <a:r>
-              <a:rPr lang="es-ES" sz="4800" b="1" dirty="0" smtClean="0"/>
+              <a:rPr lang="es-ES" sz="4800" b="1" dirty="0"/>
               <a:t>MVC - </a:t>
             </a:r>
             <a:r>
-              <a:rPr lang="es-ES" sz="3200" b="1" dirty="0" smtClean="0"/>
+              <a:rPr lang="es-ES" sz="3200" b="1" dirty="0"/>
               <a:t>¿Quién es quién?</a:t>
             </a:r>
             <a:endParaRPr lang="es-ES" sz="4800" b="1" dirty="0"/>
@@ -4973,7 +4974,7 @@
         </p:nvSpPr>
         <p:spPr>
           <a:xfrm>
-            <a:off x="3076574" y="4691282"/>
+            <a:off x="3076575" y="4691283"/>
             <a:ext cx="2060620" cy="1922324"/>
           </a:xfrm>
           <a:prstGeom prst="ellipse">
@@ -5005,7 +5006,7 @@
           <a:p>
             <a:pPr algn="ctr"/>
             <a:r>
-              <a:rPr lang="es-ES" sz="2400" b="1" dirty="0" smtClean="0">
+              <a:rPr lang="es-ES" sz="2400" b="1" dirty="0">
                 <a:solidFill>
                   <a:schemeClr val="tx1">
                     <a:lumMod val="85000"/>
@@ -5034,7 +5035,7 @@
         </p:nvSpPr>
         <p:spPr>
           <a:xfrm>
-            <a:off x="4917585" y="2190941"/>
+            <a:off x="4917586" y="2190942"/>
             <a:ext cx="2060620" cy="1922324"/>
           </a:xfrm>
           <a:prstGeom prst="ellipse">
@@ -5066,7 +5067,7 @@
           <a:p>
             <a:pPr algn="ctr"/>
             <a:r>
-              <a:rPr lang="es-ES" sz="2400" b="1" dirty="0" smtClean="0">
+              <a:rPr lang="es-ES" sz="2400" b="1" dirty="0">
                 <a:ln w="0"/>
                 <a:solidFill>
                   <a:schemeClr val="tx1">
@@ -5096,7 +5097,7 @@
         </p:nvSpPr>
         <p:spPr>
           <a:xfrm>
-            <a:off x="6761899" y="4691282"/>
+            <a:off x="6761899" y="4691283"/>
             <a:ext cx="2060620" cy="1922324"/>
           </a:xfrm>
           <a:prstGeom prst="ellipse">
@@ -5128,7 +5129,7 @@
           <a:p>
             <a:pPr algn="ctr"/>
             <a:r>
-              <a:rPr lang="es-ES" sz="2400" b="1" dirty="0" smtClean="0">
+              <a:rPr lang="es-ES" sz="2400" b="1" dirty="0">
                 <a:solidFill>
                   <a:schemeClr val="tx1">
                     <a:lumMod val="85000"/>
@@ -5157,8 +5158,8 @@
         </p:nvSpPr>
         <p:spPr>
           <a:xfrm rot="18818553">
-            <a:off x="4497290" y="4098036"/>
-            <a:ext cx="695459" cy="347730"/>
+            <a:off x="4497293" y="4098038"/>
+            <a:ext cx="695459" cy="347731"/>
           </a:xfrm>
           <a:prstGeom prst="rightArrow">
             <a:avLst/>
@@ -5197,8 +5198,8 @@
         </p:nvSpPr>
         <p:spPr>
           <a:xfrm rot="10800000">
-            <a:off x="5533623" y="5478579"/>
-            <a:ext cx="789904" cy="347730"/>
+            <a:off x="5533623" y="5478581"/>
+            <a:ext cx="789904" cy="347731"/>
           </a:xfrm>
           <a:prstGeom prst="rightArrow">
             <a:avLst/>
@@ -5237,8 +5238,8 @@
         </p:nvSpPr>
         <p:spPr>
           <a:xfrm rot="2544579">
-            <a:off x="6524960" y="4153672"/>
-            <a:ext cx="888642" cy="353590"/>
+            <a:off x="6524962" y="4153675"/>
+            <a:ext cx="888643" cy="353591"/>
           </a:xfrm>
           <a:prstGeom prst="leftRightArrow">
             <a:avLst/>
@@ -5277,7 +5278,7 @@
         </p:nvSpPr>
         <p:spPr>
           <a:xfrm>
-            <a:off x="1081409" y="2413450"/>
+            <a:off x="1081410" y="2413451"/>
             <a:ext cx="2060620" cy="1922324"/>
           </a:xfrm>
           <a:prstGeom prst="ellipse">
@@ -5311,7 +5312,7 @@
           <a:p>
             <a:pPr algn="ctr"/>
             <a:r>
-              <a:rPr lang="es-ES" sz="2000" b="1" dirty="0" smtClean="0">
+              <a:rPr lang="es-ES" sz="2000" b="1" dirty="0">
                 <a:solidFill>
                   <a:schemeClr val="tx1">
                     <a:lumMod val="85000"/>
@@ -5340,8 +5341,8 @@
         </p:nvSpPr>
         <p:spPr>
           <a:xfrm rot="13794399">
-            <a:off x="2654683" y="4450387"/>
-            <a:ext cx="695459" cy="347730"/>
+            <a:off x="2654686" y="4450389"/>
+            <a:ext cx="695459" cy="347731"/>
           </a:xfrm>
           <a:prstGeom prst="rightArrow">
             <a:avLst/>
@@ -5381,7 +5382,7 @@
         <p:spPr>
           <a:xfrm rot="13794399">
             <a:off x="363429" y="2571116"/>
-            <a:ext cx="695459" cy="347730"/>
+            <a:ext cx="695459" cy="347731"/>
           </a:xfrm>
           <a:prstGeom prst="rightArrow">
             <a:avLst/>
@@ -5420,8 +5421,8 @@
         </p:nvSpPr>
         <p:spPr>
           <a:xfrm rot="10800000">
-            <a:off x="184172" y="3131812"/>
-            <a:ext cx="695459" cy="347730"/>
+            <a:off x="184173" y="3131812"/>
+            <a:ext cx="695459" cy="347731"/>
           </a:xfrm>
           <a:prstGeom prst="rightArrow">
             <a:avLst/>
@@ -5460,8 +5461,8 @@
         </p:nvSpPr>
         <p:spPr>
           <a:xfrm rot="8117492">
-            <a:off x="344090" y="3673869"/>
-            <a:ext cx="695459" cy="347730"/>
+            <a:off x="344091" y="3673869"/>
+            <a:ext cx="695459" cy="347731"/>
           </a:xfrm>
           <a:prstGeom prst="rightArrow">
             <a:avLst/>
@@ -5753,7 +5754,7 @@
         </p:blipFill>
         <p:spPr bwMode="auto">
           <a:xfrm>
-            <a:off x="9972094" y="401035"/>
+            <a:off x="9972097" y="401035"/>
             <a:ext cx="2186181" cy="1639636"/>
           </a:xfrm>
           <a:prstGeom prst="rect">
@@ -5794,7 +5795,7 @@
           <a:lstStyle/>
           <a:p>
             <a:r>
-              <a:rPr lang="es-ES" sz="4800" b="1" dirty="0" smtClean="0"/>
+              <a:rPr lang="es-ES" sz="4800" b="1" dirty="0"/>
               <a:t>Demo</a:t>
             </a:r>
             <a:endParaRPr lang="es-ES" sz="4800" b="1" dirty="0"/>
@@ -5805,6 +5806,325 @@
     <p:extLst>
       <p:ext uri="{BB962C8B-B14F-4D97-AF65-F5344CB8AC3E}">
         <p14:creationId xmlns:p14="http://schemas.microsoft.com/office/powerpoint/2010/main" val="3780523125"/>
+      </p:ext>
+    </p:extLst>
+  </p:cSld>
+  <p:clrMapOvr>
+    <a:masterClrMapping/>
+  </p:clrMapOvr>
+  <p:timing>
+    <p:tnLst>
+      <p:par>
+        <p:cTn id="1" dur="indefinite" restart="never" nodeType="tmRoot"/>
+      </p:par>
+    </p:tnLst>
+  </p:timing>
+</p:sld>
+</file>
+
+<file path=ppt/slides/slide7.xml><?xml version="1.0" encoding="utf-8"?>
+<p:sld xmlns:a="http://schemas.openxmlformats.org/drawingml/2006/main" xmlns:r="http://schemas.openxmlformats.org/officeDocument/2006/relationships" xmlns:p="http://schemas.openxmlformats.org/presentationml/2006/main">
+  <p:cSld>
+    <p:spTree>
+      <p:nvGrpSpPr>
+        <p:cNvPr id="1" name=""/>
+        <p:cNvGrpSpPr/>
+        <p:nvPr/>
+      </p:nvGrpSpPr>
+      <p:grpSpPr>
+        <a:xfrm>
+          <a:off x="0" y="0"/>
+          <a:ext cx="0" cy="0"/>
+          <a:chOff x="0" y="0"/>
+          <a:chExt cx="0" cy="0"/>
+        </a:xfrm>
+      </p:grpSpPr>
+      <p:pic>
+        <p:nvPicPr>
+          <p:cNvPr id="2050" name="Picture 2" descr="https://dukt.net/uploads/consulting/angularjs.png"/>
+          <p:cNvPicPr>
+            <a:picLocks noChangeAspect="1" noChangeArrowheads="1"/>
+          </p:cNvPicPr>
+          <p:nvPr/>
+        </p:nvPicPr>
+        <p:blipFill>
+          <a:blip r:embed="rId2">
+            <a:extLst>
+              <a:ext uri="{28A0092B-C50C-407E-A947-70E740481C1C}">
+                <a14:useLocalDpi xmlns:a14="http://schemas.microsoft.com/office/drawing/2010/main" val="0"/>
+              </a:ext>
+            </a:extLst>
+          </a:blip>
+          <a:srcRect/>
+          <a:stretch>
+            <a:fillRect/>
+          </a:stretch>
+        </p:blipFill>
+        <p:spPr bwMode="auto">
+          <a:xfrm>
+            <a:off x="9972097" y="401035"/>
+            <a:ext cx="2186181" cy="1639636"/>
+          </a:xfrm>
+          <a:prstGeom prst="rect">
+            <a:avLst/>
+          </a:prstGeom>
+          <a:noFill/>
+          <a:extLst>
+            <a:ext uri="{909E8E84-426E-40DD-AFC4-6F175D3DCCD1}">
+              <a14:hiddenFill xmlns:a14="http://schemas.microsoft.com/office/drawing/2010/main">
+                <a:solidFill>
+                  <a:srgbClr val="FFFFFF"/>
+                </a:solidFill>
+              </a14:hiddenFill>
+            </a:ext>
+          </a:extLst>
+        </p:spPr>
+      </p:pic>
+      <p:sp>
+        <p:nvSpPr>
+          <p:cNvPr id="7" name="Título 6"/>
+          <p:cNvSpPr>
+            <a:spLocks noGrp="1"/>
+          </p:cNvSpPr>
+          <p:nvPr>
+            <p:ph type="title"/>
+          </p:nvPr>
+        </p:nvSpPr>
+        <p:spPr>
+          <a:xfrm>
+            <a:off x="581192" y="599124"/>
+            <a:ext cx="11029616" cy="1013800"/>
+          </a:xfrm>
+        </p:spPr>
+        <p:txBody>
+          <a:bodyPr>
+            <a:noAutofit/>
+          </a:bodyPr>
+          <a:lstStyle/>
+          <a:p>
+            <a:r>
+              <a:rPr lang="es-ES" sz="4800" b="1" dirty="0"/>
+              <a:t>LINKS DE INTERES</a:t>
+            </a:r>
+            <a:endParaRPr lang="es-ES" sz="4800" b="1" dirty="0"/>
+          </a:p>
+        </p:txBody>
+      </p:sp>
+      <p:sp>
+        <p:nvSpPr>
+          <p:cNvPr id="3" name="CuadroTexto 2"/>
+          <p:cNvSpPr txBox="1"/>
+          <p:nvPr/>
+        </p:nvSpPr>
+        <p:spPr>
+          <a:xfrm>
+            <a:off x="581192" y="2040671"/>
+            <a:ext cx="11165984" cy="5878532"/>
+          </a:xfrm>
+          <a:prstGeom prst="rect">
+            <a:avLst/>
+          </a:prstGeom>
+          <a:noFill/>
+        </p:spPr>
+        <p:txBody>
+          <a:bodyPr wrap="square" rtlCol="0">
+            <a:spAutoFit/>
+          </a:bodyPr>
+          <a:lstStyle/>
+          <a:p>
+            <a:pPr marL="285744" indent="-285744" algn="just">
+              <a:lnSpc>
+                <a:spcPct val="200000"/>
+              </a:lnSpc>
+              <a:buFont typeface="Arial" panose="020B0604020202020204" pitchFamily="34" charset="0"/>
+              <a:buChar char="•"/>
+            </a:pPr>
+            <a:r>
+              <a:rPr lang="es-ES" dirty="0">
+                <a:solidFill>
+                  <a:schemeClr val="tx1">
+                    <a:lumMod val="95000"/>
+                    <a:lumOff val="5000"/>
+                  </a:schemeClr>
+                </a:solidFill>
+                <a:hlinkClick r:id="rId3"/>
+              </a:rPr>
+              <a:t>http://www.yearofmoo.com/</a:t>
+            </a:r>
+            <a:endParaRPr lang="es-ES" dirty="0">
+              <a:solidFill>
+                <a:schemeClr val="tx1">
+                  <a:lumMod val="95000"/>
+                  <a:lumOff val="5000"/>
+                </a:schemeClr>
+              </a:solidFill>
+            </a:endParaRPr>
+          </a:p>
+          <a:p>
+            <a:pPr marL="285744" indent="-285744" algn="just">
+              <a:lnSpc>
+                <a:spcPct val="200000"/>
+              </a:lnSpc>
+              <a:buFont typeface="Arial" panose="020B0604020202020204" pitchFamily="34" charset="0"/>
+              <a:buChar char="•"/>
+            </a:pPr>
+            <a:r>
+              <a:rPr lang="es-ES" dirty="0">
+                <a:solidFill>
+                  <a:schemeClr val="tx1">
+                    <a:lumMod val="95000"/>
+                    <a:lumOff val="5000"/>
+                  </a:schemeClr>
+                </a:solidFill>
+                <a:hlinkClick r:id="rId4"/>
+              </a:rPr>
+              <a:t>http://trochette.github.io/Angular-Design-Patterns-Best-Practices/</a:t>
+            </a:r>
+            <a:endParaRPr lang="es-ES" dirty="0">
+              <a:solidFill>
+                <a:schemeClr val="tx1">
+                  <a:lumMod val="95000"/>
+                  <a:lumOff val="5000"/>
+                </a:schemeClr>
+              </a:solidFill>
+            </a:endParaRPr>
+          </a:p>
+          <a:p>
+            <a:pPr marL="285744" indent="-285744" algn="just">
+              <a:lnSpc>
+                <a:spcPct val="200000"/>
+              </a:lnSpc>
+              <a:buFont typeface="Arial" panose="020B0604020202020204" pitchFamily="34" charset="0"/>
+              <a:buChar char="•"/>
+            </a:pPr>
+            <a:r>
+              <a:rPr lang="es-ES" dirty="0">
+                <a:solidFill>
+                  <a:schemeClr val="tx1">
+                    <a:lumMod val="95000"/>
+                    <a:lumOff val="5000"/>
+                  </a:schemeClr>
+                </a:solidFill>
+                <a:hlinkClick r:id="rId5"/>
+              </a:rPr>
+              <a:t>http://www.revillweb.com/tutorials/angularjs-in-30-minutes-angularjs-tutorial/</a:t>
+            </a:r>
+            <a:endParaRPr lang="es-ES" dirty="0">
+              <a:solidFill>
+                <a:schemeClr val="tx1">
+                  <a:lumMod val="95000"/>
+                  <a:lumOff val="5000"/>
+                </a:schemeClr>
+              </a:solidFill>
+            </a:endParaRPr>
+          </a:p>
+          <a:p>
+            <a:pPr marL="285744" indent="-285744" algn="just">
+              <a:lnSpc>
+                <a:spcPct val="200000"/>
+              </a:lnSpc>
+              <a:buFont typeface="Arial" panose="020B0604020202020204" pitchFamily="34" charset="0"/>
+              <a:buChar char="•"/>
+            </a:pPr>
+            <a:r>
+              <a:rPr lang="es-ES" dirty="0">
+                <a:solidFill>
+                  <a:schemeClr val="tx1">
+                    <a:lumMod val="95000"/>
+                    <a:lumOff val="5000"/>
+                  </a:schemeClr>
+                </a:solidFill>
+                <a:hlinkClick r:id="rId6"/>
+              </a:rPr>
+              <a:t>http://www.designyourway.net/blog/resources/so-you-want-to-learn-angularjs-start-with-these-tutorials-and-resources/</a:t>
+            </a:r>
+            <a:endParaRPr lang="es-ES" dirty="0">
+              <a:solidFill>
+                <a:schemeClr val="tx1">
+                  <a:lumMod val="95000"/>
+                  <a:lumOff val="5000"/>
+                </a:schemeClr>
+              </a:solidFill>
+            </a:endParaRPr>
+          </a:p>
+          <a:p>
+            <a:pPr marL="285744" indent="-285744" algn="just">
+              <a:lnSpc>
+                <a:spcPct val="200000"/>
+              </a:lnSpc>
+              <a:buFont typeface="Arial" panose="020B0604020202020204" pitchFamily="34" charset="0"/>
+              <a:buChar char="•"/>
+            </a:pPr>
+            <a:r>
+              <a:rPr lang="es-ES" dirty="0">
+                <a:solidFill>
+                  <a:schemeClr val="tx1">
+                    <a:lumMod val="95000"/>
+                    <a:lumOff val="5000"/>
+                  </a:schemeClr>
+                </a:solidFill>
+                <a:hlinkClick r:id="rId7"/>
+              </a:rPr>
+              <a:t>http://newtriks.com/2013/06/11/automating-angularjs-with-yeoman-grunt-and-bower/</a:t>
+            </a:r>
+            <a:endParaRPr lang="es-ES" dirty="0">
+              <a:solidFill>
+                <a:schemeClr val="tx1">
+                  <a:lumMod val="95000"/>
+                  <a:lumOff val="5000"/>
+                </a:schemeClr>
+              </a:solidFill>
+            </a:endParaRPr>
+          </a:p>
+          <a:p>
+            <a:pPr marL="285744" indent="-285744">
+              <a:lnSpc>
+                <a:spcPct val="200000"/>
+              </a:lnSpc>
+              <a:buFont typeface="Arial" panose="020B0604020202020204" pitchFamily="34" charset="0"/>
+              <a:buChar char="•"/>
+            </a:pPr>
+            <a:endParaRPr lang="es-ES" sz="2000" dirty="0">
+              <a:solidFill>
+                <a:schemeClr val="tx1">
+                  <a:lumMod val="95000"/>
+                  <a:lumOff val="5000"/>
+                </a:schemeClr>
+              </a:solidFill>
+            </a:endParaRPr>
+          </a:p>
+          <a:p>
+            <a:pPr marL="285744" indent="-285744" algn="ctr">
+              <a:lnSpc>
+                <a:spcPct val="200000"/>
+              </a:lnSpc>
+              <a:buFont typeface="Arial" panose="020B0604020202020204" pitchFamily="34" charset="0"/>
+              <a:buChar char="•"/>
+            </a:pPr>
+            <a:endParaRPr lang="es-ES" sz="2000" dirty="0"/>
+          </a:p>
+          <a:p>
+            <a:pPr>
+              <a:lnSpc>
+                <a:spcPct val="200000"/>
+              </a:lnSpc>
+            </a:pPr>
+            <a:endParaRPr lang="es-ES" sz="2000" dirty="0"/>
+          </a:p>
+          <a:p>
+            <a:pPr>
+              <a:lnSpc>
+                <a:spcPct val="200000"/>
+              </a:lnSpc>
+            </a:pPr>
+            <a:endParaRPr lang="es-ES" sz="2000" dirty="0"/>
+          </a:p>
+        </p:txBody>
+      </p:sp>
+    </p:spTree>
+    <p:extLst>
+      <p:ext uri="{BB962C8B-B14F-4D97-AF65-F5344CB8AC3E}">
+        <p14:creationId xmlns:p14="http://schemas.microsoft.com/office/powerpoint/2010/main" val="2145515239"/>
       </p:ext>
     </p:extLst>
   </p:cSld>

</xml_diff>